<commit_message>
updating summary and final
</commit_message>
<xml_diff>
--- a/Summary_Schutt-2014S.pptx
+++ b/Summary_Schutt-2014S.pptx
@@ -4454,7 +4454,40 @@
               <a:rPr lang="en-US" sz="4000" smtClean="0">
                 <a:latin typeface="Calibri" pitchFamily="34" charset="0"/>
               </a:rPr>
-              <a:t>Project Introduction</a:t>
+              <a:t>We elected </a:t>
+            </a:r>
+            <a:r>
+              <a:rPr lang="en-US" sz="4000" dirty="0">
+                <a:latin typeface="Calibri" pitchFamily="34" charset="0"/>
+              </a:rPr>
+              <a:t>to create a native Android application that leverages the Google Maps API v2 for Android as the basis for displaying and communicating the results of our custom algorithm for determining multi-modal transit routes between destinations and specific points of interest. The algorithm itself was developed in python to be run on a server. We decided to offload this computation from the client-side because of the complexity and resource-intensive calculation that must occur to determine the least costly route from an origin to a destination via some points of interest</a:t>
+            </a:r>
+            <a:r>
+              <a:rPr lang="en-US" sz="4000" dirty="0" smtClean="0">
+                <a:latin typeface="Calibri" pitchFamily="34" charset="0"/>
+              </a:rPr>
+              <a:t>.</a:t>
+            </a:r>
+          </a:p>
+          <a:p>
+            <a:pPr algn="just" eaLnBrk="1" hangingPunct="1"/>
+            <a:endParaRPr lang="en-US" sz="4000" dirty="0">
+              <a:latin typeface="Calibri" pitchFamily="34" charset="0"/>
+            </a:endParaRPr>
+          </a:p>
+          <a:p>
+            <a:pPr algn="just" eaLnBrk="1" hangingPunct="1"/>
+            <a:r>
+              <a:rPr lang="en-US" sz="4000" dirty="0">
+                <a:latin typeface="Calibri" pitchFamily="34" charset="0"/>
+              </a:rPr>
+              <a:t>The client side application is a simple single-page app that provides the user with auto-completion on the addresses or points of interest that they are searching. The points of interest can be as simple as a single category for a business type (e.g., a gym) or as specific as a restaurant (e.g., The Greene Turtle</a:t>
+            </a:r>
+            <a:r>
+              <a:rPr lang="en-US" sz="4000" dirty="0" smtClean="0">
+                <a:latin typeface="Calibri" pitchFamily="34" charset="0"/>
+              </a:rPr>
+              <a:t>).</a:t>
             </a:r>
             <a:endParaRPr lang="en-US" sz="4000" dirty="0">
               <a:latin typeface="Calibri" pitchFamily="34" charset="0"/>

</xml_diff>